<commit_message>
Made some changes in the presentation.
</commit_message>
<xml_diff>
--- a/Presentation/Allied-Tion.pptx
+++ b/Presentation/Allied-Tion.pptx
@@ -4046,8 +4046,8 @@
         </p:nvSpPr>
         <p:spPr>
           <a:xfrm>
-            <a:off x="3825572" y="2049411"/>
-            <a:ext cx="1677511" cy="400110"/>
+            <a:off x="516647" y="2711552"/>
+            <a:ext cx="1526956" cy="369332"/>
           </a:xfrm>
           <a:prstGeom prst="rect">
             <a:avLst/>
@@ -4061,7 +4061,7 @@
           <a:lstStyle/>
           <a:p>
             <a:r>
-              <a:rPr lang="en-US" sz="2000" b="1" dirty="0" smtClean="0">
+              <a:rPr lang="en-US" b="1" dirty="0" smtClean="0">
                 <a:effectLst>
                   <a:outerShdw blurRad="38100" dist="38100" dir="2700000" algn="tl">
                     <a:srgbClr val="000000">
@@ -4072,7 +4072,7 @@
               </a:rPr>
               <a:t>Yavor Tenev</a:t>
             </a:r>
-            <a:endParaRPr lang="en-US" sz="2000" b="1" dirty="0">
+            <a:endParaRPr lang="en-US" b="1" dirty="0">
               <a:effectLst>
                 <a:outerShdw blurRad="38100" dist="38100" dir="2700000" algn="tl">
                   <a:srgbClr val="000000">
@@ -4092,8 +4092,8 @@
         </p:nvSpPr>
         <p:spPr>
           <a:xfrm>
-            <a:off x="3706373" y="2579315"/>
-            <a:ext cx="1963999" cy="400110"/>
+            <a:off x="6357106" y="2711552"/>
+            <a:ext cx="1787669" cy="369332"/>
           </a:xfrm>
           <a:prstGeom prst="rect">
             <a:avLst/>
@@ -4107,7 +4107,7 @@
           <a:lstStyle/>
           <a:p>
             <a:r>
-              <a:rPr lang="en-US" sz="2000" b="1" dirty="0" smtClean="0">
+              <a:rPr lang="en-US" b="1" dirty="0" smtClean="0">
                 <a:effectLst>
                   <a:outerShdw blurRad="38100" dist="38100" dir="2700000" algn="tl">
                     <a:srgbClr val="000000">
@@ -4118,7 +4118,7 @@
               </a:rPr>
               <a:t>Georgi Matsov</a:t>
             </a:r>
-            <a:endParaRPr lang="en-US" sz="2000" b="1" dirty="0">
+            <a:endParaRPr lang="en-US" b="1" dirty="0">
               <a:effectLst>
                 <a:outerShdw blurRad="38100" dist="38100" dir="2700000" algn="tl">
                   <a:srgbClr val="000000">
@@ -4138,7 +4138,7 @@
         </p:nvSpPr>
         <p:spPr>
           <a:xfrm>
-            <a:off x="3618015" y="3128147"/>
+            <a:off x="6705600" y="6206459"/>
             <a:ext cx="2140714" cy="400110"/>
           </a:xfrm>
           <a:prstGeom prst="rect">
@@ -4184,8 +4184,8 @@
         </p:nvSpPr>
         <p:spPr>
           <a:xfrm>
-            <a:off x="3504394" y="4249118"/>
-            <a:ext cx="2367956" cy="400110"/>
+            <a:off x="3118154" y="2711552"/>
+            <a:ext cx="2146742" cy="369332"/>
           </a:xfrm>
           <a:prstGeom prst="rect">
             <a:avLst/>
@@ -4199,7 +4199,7 @@
           <a:lstStyle/>
           <a:p>
             <a:r>
-              <a:rPr lang="en-US" sz="2000" b="1" dirty="0" smtClean="0">
+              <a:rPr lang="en-US" b="1" dirty="0" smtClean="0">
                 <a:effectLst>
                   <a:outerShdw blurRad="38100" dist="38100" dir="2700000" algn="tl">
                     <a:srgbClr val="000000">
@@ -4210,7 +4210,7 @@
               </a:rPr>
               <a:t>Atanas Bogdanov</a:t>
             </a:r>
-            <a:endParaRPr lang="en-US" sz="2000" b="1" dirty="0">
+            <a:endParaRPr lang="en-US" b="1" dirty="0">
               <a:effectLst>
                 <a:outerShdw blurRad="38100" dist="38100" dir="2700000" algn="tl">
                   <a:srgbClr val="000000">
@@ -4230,8 +4230,8 @@
         </p:nvSpPr>
         <p:spPr>
           <a:xfrm>
-            <a:off x="3371922" y="3689222"/>
-            <a:ext cx="2632900" cy="400110"/>
+            <a:off x="2956044" y="4578726"/>
+            <a:ext cx="2386294" cy="369332"/>
           </a:xfrm>
           <a:prstGeom prst="rect">
             <a:avLst/>
@@ -4245,7 +4245,7 @@
           <a:lstStyle/>
           <a:p>
             <a:r>
-              <a:rPr lang="en-US" sz="2000" b="1" dirty="0" smtClean="0">
+              <a:rPr lang="en-US" b="1" dirty="0" smtClean="0">
                 <a:effectLst>
                   <a:outerShdw blurRad="38100" dist="38100" dir="2700000" algn="tl">
                     <a:srgbClr val="000000">
@@ -4256,7 +4256,7 @@
               </a:rPr>
               <a:t>Konstantin Yanchev</a:t>
             </a:r>
-            <a:endParaRPr lang="en-US" sz="2000" b="1" dirty="0">
+            <a:endParaRPr lang="en-US" b="1" dirty="0">
               <a:effectLst>
                 <a:outerShdw blurRad="38100" dist="38100" dir="2700000" algn="tl">
                   <a:srgbClr val="000000">
@@ -4276,7 +4276,7 @@
         </p:nvSpPr>
         <p:spPr>
           <a:xfrm>
-            <a:off x="3634237" y="4867927"/>
+            <a:off x="7035731" y="6381578"/>
             <a:ext cx="2108269" cy="400110"/>
           </a:xfrm>
           <a:prstGeom prst="rect">
@@ -4344,6 +4344,335 @@
           </a:prstGeom>
         </p:spPr>
       </p:pic>
+      <p:pic>
+        <p:nvPicPr>
+          <p:cNvPr id="1026" name="Picture 2" descr="C:\Users\konstantin\Desktop\Atanas Kefsizov.jpg"/>
+          <p:cNvPicPr>
+            <a:picLocks noChangeAspect="1" noChangeArrowheads="1"/>
+          </p:cNvPicPr>
+          <p:nvPr/>
+        </p:nvPicPr>
+        <p:blipFill>
+          <a:blip r:embed="rId3" cstate="print">
+            <a:extLst>
+              <a:ext uri="{28A0092B-C50C-407E-A947-70E740481C1C}">
+                <a14:useLocalDpi xmlns:a14="http://schemas.microsoft.com/office/drawing/2010/main" val="0"/>
+              </a:ext>
+            </a:extLst>
+          </a:blip>
+          <a:srcRect/>
+          <a:stretch>
+            <a:fillRect/>
+          </a:stretch>
+        </p:blipFill>
+        <p:spPr bwMode="auto">
+          <a:xfrm>
+            <a:off x="6509256" y="3200400"/>
+            <a:ext cx="1355484" cy="1355484"/>
+          </a:xfrm>
+          <a:prstGeom prst="rect">
+            <a:avLst/>
+          </a:prstGeom>
+          <a:noFill/>
+          <a:extLst>
+            <a:ext uri="{909E8E84-426E-40DD-AFC4-6F175D3DCCD1}">
+              <a14:hiddenFill xmlns:a14="http://schemas.microsoft.com/office/drawing/2010/main">
+                <a:solidFill>
+                  <a:srgbClr val="FFFFFF"/>
+                </a:solidFill>
+              </a14:hiddenFill>
+            </a:ext>
+          </a:extLst>
+        </p:spPr>
+      </p:pic>
+      <p:pic>
+        <p:nvPicPr>
+          <p:cNvPr id="1027" name="Picture 3" descr="C:\Users\konstantin\Desktop\GeorgiMatsov.jpg"/>
+          <p:cNvPicPr>
+            <a:picLocks noChangeAspect="1" noChangeArrowheads="1"/>
+          </p:cNvPicPr>
+          <p:nvPr/>
+        </p:nvPicPr>
+        <p:blipFill>
+          <a:blip r:embed="rId4" cstate="print">
+            <a:extLst>
+              <a:ext uri="{28A0092B-C50C-407E-A947-70E740481C1C}">
+                <a14:useLocalDpi xmlns:a14="http://schemas.microsoft.com/office/drawing/2010/main" val="0"/>
+              </a:ext>
+            </a:extLst>
+          </a:blip>
+          <a:srcRect/>
+          <a:stretch>
+            <a:fillRect/>
+          </a:stretch>
+        </p:blipFill>
+        <p:spPr bwMode="auto">
+          <a:xfrm>
+            <a:off x="6577082" y="1371600"/>
+            <a:ext cx="1347718" cy="1347718"/>
+          </a:xfrm>
+          <a:prstGeom prst="rect">
+            <a:avLst/>
+          </a:prstGeom>
+          <a:noFill/>
+          <a:extLst>
+            <a:ext uri="{909E8E84-426E-40DD-AFC4-6F175D3DCCD1}">
+              <a14:hiddenFill xmlns:a14="http://schemas.microsoft.com/office/drawing/2010/main">
+                <a:solidFill>
+                  <a:srgbClr val="FFFFFF"/>
+                </a:solidFill>
+              </a14:hiddenFill>
+            </a:ext>
+          </a:extLst>
+        </p:spPr>
+      </p:pic>
+      <p:pic>
+        <p:nvPicPr>
+          <p:cNvPr id="1028" name="Picture 4" descr="C:\Users\konstantin\Desktop\konstantin qnchev.jpg"/>
+          <p:cNvPicPr>
+            <a:picLocks noChangeAspect="1" noChangeArrowheads="1"/>
+          </p:cNvPicPr>
+          <p:nvPr/>
+        </p:nvPicPr>
+        <p:blipFill>
+          <a:blip r:embed="rId5" cstate="print">
+            <a:extLst>
+              <a:ext uri="{28A0092B-C50C-407E-A947-70E740481C1C}">
+                <a14:useLocalDpi xmlns:a14="http://schemas.microsoft.com/office/drawing/2010/main" val="0"/>
+              </a:ext>
+            </a:extLst>
+          </a:blip>
+          <a:srcRect/>
+          <a:stretch>
+            <a:fillRect/>
+          </a:stretch>
+        </p:blipFill>
+        <p:spPr bwMode="auto">
+          <a:xfrm>
+            <a:off x="3475332" y="3200400"/>
+            <a:ext cx="1347718" cy="1354317"/>
+          </a:xfrm>
+          <a:prstGeom prst="rect">
+            <a:avLst/>
+          </a:prstGeom>
+          <a:noFill/>
+          <a:extLst>
+            <a:ext uri="{909E8E84-426E-40DD-AFC4-6F175D3DCCD1}">
+              <a14:hiddenFill xmlns:a14="http://schemas.microsoft.com/office/drawing/2010/main">
+                <a:solidFill>
+                  <a:srgbClr val="FFFFFF"/>
+                </a:solidFill>
+              </a14:hiddenFill>
+            </a:ext>
+          </a:extLst>
+        </p:spPr>
+      </p:pic>
+      <p:pic>
+        <p:nvPicPr>
+          <p:cNvPr id="1029" name="Picture 5" descr="C:\Users\konstantin\Desktop\qvor tenev.jpg"/>
+          <p:cNvPicPr>
+            <a:picLocks noChangeAspect="1" noChangeArrowheads="1"/>
+          </p:cNvPicPr>
+          <p:nvPr/>
+        </p:nvPicPr>
+        <p:blipFill>
+          <a:blip r:embed="rId6" cstate="print">
+            <a:extLst>
+              <a:ext uri="{28A0092B-C50C-407E-A947-70E740481C1C}">
+                <a14:useLocalDpi xmlns:a14="http://schemas.microsoft.com/office/drawing/2010/main" val="0"/>
+              </a:ext>
+            </a:extLst>
+          </a:blip>
+          <a:srcRect/>
+          <a:stretch>
+            <a:fillRect/>
+          </a:stretch>
+        </p:blipFill>
+        <p:spPr bwMode="auto">
+          <a:xfrm>
+            <a:off x="610149" y="1371600"/>
+            <a:ext cx="1339952" cy="1339952"/>
+          </a:xfrm>
+          <a:prstGeom prst="rect">
+            <a:avLst/>
+          </a:prstGeom>
+          <a:noFill/>
+          <a:extLst>
+            <a:ext uri="{909E8E84-426E-40DD-AFC4-6F175D3DCCD1}">
+              <a14:hiddenFill xmlns:a14="http://schemas.microsoft.com/office/drawing/2010/main">
+                <a:solidFill>
+                  <a:srgbClr val="FFFFFF"/>
+                </a:solidFill>
+              </a14:hiddenFill>
+            </a:ext>
+          </a:extLst>
+        </p:spPr>
+      </p:pic>
+      <p:pic>
+        <p:nvPicPr>
+          <p:cNvPr id="1030" name="Picture 6" descr="C:\Users\konstantin\Desktop\tihomir.jpg"/>
+          <p:cNvPicPr>
+            <a:picLocks noChangeAspect="1" noChangeArrowheads="1"/>
+          </p:cNvPicPr>
+          <p:nvPr/>
+        </p:nvPicPr>
+        <p:blipFill>
+          <a:blip r:embed="rId7">
+            <a:extLst>
+              <a:ext uri="{28A0092B-C50C-407E-A947-70E740481C1C}">
+                <a14:useLocalDpi xmlns:a14="http://schemas.microsoft.com/office/drawing/2010/main" val="0"/>
+              </a:ext>
+            </a:extLst>
+          </a:blip>
+          <a:srcRect/>
+          <a:stretch>
+            <a:fillRect/>
+          </a:stretch>
+        </p:blipFill>
+        <p:spPr bwMode="auto">
+          <a:xfrm>
+            <a:off x="601978" y="3200400"/>
+            <a:ext cx="1348123" cy="1348123"/>
+          </a:xfrm>
+          <a:prstGeom prst="rect">
+            <a:avLst/>
+          </a:prstGeom>
+          <a:noFill/>
+          <a:extLst>
+            <a:ext uri="{909E8E84-426E-40DD-AFC4-6F175D3DCCD1}">
+              <a14:hiddenFill xmlns:a14="http://schemas.microsoft.com/office/drawing/2010/main">
+                <a:solidFill>
+                  <a:srgbClr val="FFFFFF"/>
+                </a:solidFill>
+              </a14:hiddenFill>
+            </a:ext>
+          </a:extLst>
+        </p:spPr>
+      </p:pic>
+      <p:pic>
+        <p:nvPicPr>
+          <p:cNvPr id="1031" name="Picture 7" descr="C:\Users\konstantin\Desktop\Atanas Bogdanov.jpg"/>
+          <p:cNvPicPr>
+            <a:picLocks noChangeAspect="1" noChangeArrowheads="1"/>
+          </p:cNvPicPr>
+          <p:nvPr/>
+        </p:nvPicPr>
+        <p:blipFill>
+          <a:blip r:embed="rId8" cstate="print">
+            <a:extLst>
+              <a:ext uri="{28A0092B-C50C-407E-A947-70E740481C1C}">
+                <a14:useLocalDpi xmlns:a14="http://schemas.microsoft.com/office/drawing/2010/main" val="0"/>
+              </a:ext>
+            </a:extLst>
+          </a:blip>
+          <a:srcRect/>
+          <a:stretch>
+            <a:fillRect/>
+          </a:stretch>
+        </p:blipFill>
+        <p:spPr bwMode="auto">
+          <a:xfrm>
+            <a:off x="3496941" y="1371600"/>
+            <a:ext cx="1339952" cy="1339952"/>
+          </a:xfrm>
+          <a:prstGeom prst="rect">
+            <a:avLst/>
+          </a:prstGeom>
+          <a:noFill/>
+          <a:extLst>
+            <a:ext uri="{909E8E84-426E-40DD-AFC4-6F175D3DCCD1}">
+              <a14:hiddenFill xmlns:a14="http://schemas.microsoft.com/office/drawing/2010/main">
+                <a:solidFill>
+                  <a:srgbClr val="FFFFFF"/>
+                </a:solidFill>
+              </a14:hiddenFill>
+            </a:ext>
+          </a:extLst>
+        </p:spPr>
+      </p:pic>
+      <p:sp>
+        <p:nvSpPr>
+          <p:cNvPr id="2" name="TextBox 1"/>
+          <p:cNvSpPr txBox="1"/>
+          <p:nvPr/>
+        </p:nvSpPr>
+        <p:spPr>
+          <a:xfrm>
+            <a:off x="6157917" y="4555884"/>
+            <a:ext cx="2186048" cy="369332"/>
+          </a:xfrm>
+          <a:prstGeom prst="rect">
+            <a:avLst/>
+          </a:prstGeom>
+          <a:noFill/>
+        </p:spPr>
+        <p:txBody>
+          <a:bodyPr wrap="none" rtlCol="0">
+            <a:spAutoFit/>
+          </a:bodyPr>
+          <a:lstStyle/>
+          <a:p>
+            <a:r>
+              <a:rPr lang="bg-BG" b="1" dirty="0" smtClean="0">
+                <a:effectLst>
+                  <a:outerShdw blurRad="38100" dist="38100" dir="2700000" algn="tl">
+                    <a:srgbClr val="000000">
+                      <a:alpha val="43137"/>
+                    </a:srgbClr>
+                  </a:outerShdw>
+                </a:effectLst>
+              </a:rPr>
+              <a:t>Атанас Кефсизов</a:t>
+            </a:r>
+          </a:p>
+        </p:txBody>
+      </p:sp>
+      <p:sp>
+        <p:nvSpPr>
+          <p:cNvPr id="3" name="TextBox 2"/>
+          <p:cNvSpPr txBox="1"/>
+          <p:nvPr/>
+        </p:nvSpPr>
+        <p:spPr>
+          <a:xfrm>
+            <a:off x="304800" y="4561571"/>
+            <a:ext cx="2182649" cy="369332"/>
+          </a:xfrm>
+          <a:prstGeom prst="rect">
+            <a:avLst/>
+          </a:prstGeom>
+          <a:noFill/>
+        </p:spPr>
+        <p:txBody>
+          <a:bodyPr wrap="none" rtlCol="0">
+            <a:spAutoFit/>
+          </a:bodyPr>
+          <a:lstStyle/>
+          <a:p>
+            <a:r>
+              <a:rPr lang="bg-BG" b="1" dirty="0" smtClean="0">
+                <a:effectLst>
+                  <a:outerShdw blurRad="38100" dist="38100" dir="2700000" algn="tl">
+                    <a:srgbClr val="000000">
+                      <a:alpha val="43137"/>
+                    </a:srgbClr>
+                  </a:outerShdw>
+                </a:effectLst>
+              </a:rPr>
+              <a:t>Тихомир Цветков</a:t>
+            </a:r>
+            <a:endParaRPr lang="en-US" b="1" dirty="0">
+              <a:effectLst>
+                <a:outerShdw blurRad="38100" dist="38100" dir="2700000" algn="tl">
+                  <a:srgbClr val="000000">
+                    <a:alpha val="43137"/>
+                  </a:srgbClr>
+                </a:outerShdw>
+              </a:effectLst>
+            </a:endParaRPr>
+          </a:p>
+        </p:txBody>
+      </p:sp>
     </p:spTree>
     <p:extLst>
       <p:ext uri="{BB962C8B-B14F-4D97-AF65-F5344CB8AC3E}">

</xml_diff>

<commit_message>
add live link to Presentation/Allied-Tion.pptx change video position in for-beer.html
</commit_message>
<xml_diff>
--- a/Presentation/Allied-Tion.pptx
+++ b/Presentation/Allied-Tion.pptx
@@ -108,6 +108,22 @@
       </a:defRPr>
     </a:lvl9pPr>
   </p:defaultTextStyle>
+  <p:extLst>
+    <p:ext uri="{EFAFB233-063F-42B5-8137-9DF3F51BA10A}">
+      <p15:sldGuideLst xmlns:p15="http://schemas.microsoft.com/office/powerpoint/2012/main">
+        <p15:guide id="1" orient="horz" pos="2160">
+          <p15:clr>
+            <a:srgbClr val="A4A3A4"/>
+          </p15:clr>
+        </p15:guide>
+        <p15:guide id="2" pos="2880">
+          <p15:clr>
+            <a:srgbClr val="A4A3A4"/>
+          </p15:clr>
+        </p15:guide>
+      </p15:sldGuideLst>
+    </p:ext>
+  </p:extLst>
 </p:presentation>
 </file>
 
@@ -242,7 +258,7 @@
           <a:p>
             <a:fld id="{BB838F9D-C89C-430C-A914-9188E8BD18B1}" type="datetimeFigureOut">
               <a:rPr lang="en-US" smtClean="0"/>
-              <a:t>01/06/2016</a:t>
+              <a:t>1/7/2016</a:t>
             </a:fld>
             <a:endParaRPr lang="en-US"/>
           </a:p>
@@ -424,7 +440,7 @@
           <a:p>
             <a:fld id="{BB838F9D-C89C-430C-A914-9188E8BD18B1}" type="datetimeFigureOut">
               <a:rPr lang="en-US" smtClean="0"/>
-              <a:t>01/06/2016</a:t>
+              <a:t>1/7/2016</a:t>
             </a:fld>
             <a:endParaRPr lang="en-US"/>
           </a:p>
@@ -616,7 +632,7 @@
           <a:p>
             <a:fld id="{BB838F9D-C89C-430C-A914-9188E8BD18B1}" type="datetimeFigureOut">
               <a:rPr lang="en-US" smtClean="0"/>
-              <a:t>01/06/2016</a:t>
+              <a:t>1/7/2016</a:t>
             </a:fld>
             <a:endParaRPr lang="en-US"/>
           </a:p>
@@ -798,7 +814,7 @@
           <a:p>
             <a:fld id="{BB838F9D-C89C-430C-A914-9188E8BD18B1}" type="datetimeFigureOut">
               <a:rPr lang="en-US" smtClean="0"/>
-              <a:t>01/06/2016</a:t>
+              <a:t>1/7/2016</a:t>
             </a:fld>
             <a:endParaRPr lang="en-US"/>
           </a:p>
@@ -1002,7 +1018,7 @@
           <a:p>
             <a:fld id="{BB838F9D-C89C-430C-A914-9188E8BD18B1}" type="datetimeFigureOut">
               <a:rPr lang="en-US" smtClean="0"/>
-              <a:t>01/06/2016</a:t>
+              <a:t>1/7/2016</a:t>
             </a:fld>
             <a:endParaRPr lang="en-US"/>
           </a:p>
@@ -1302,7 +1318,7 @@
           <a:p>
             <a:fld id="{BB838F9D-C89C-430C-A914-9188E8BD18B1}" type="datetimeFigureOut">
               <a:rPr lang="en-US" smtClean="0"/>
-              <a:t>01/06/2016</a:t>
+              <a:t>1/7/2016</a:t>
             </a:fld>
             <a:endParaRPr lang="en-US"/>
           </a:p>
@@ -1736,7 +1752,7 @@
           <a:p>
             <a:fld id="{BB838F9D-C89C-430C-A914-9188E8BD18B1}" type="datetimeFigureOut">
               <a:rPr lang="en-US" smtClean="0"/>
-              <a:t>01/06/2016</a:t>
+              <a:t>1/7/2016</a:t>
             </a:fld>
             <a:endParaRPr lang="en-US"/>
           </a:p>
@@ -1866,7 +1882,7 @@
           <a:p>
             <a:fld id="{BB838F9D-C89C-430C-A914-9188E8BD18B1}" type="datetimeFigureOut">
               <a:rPr lang="en-US" smtClean="0"/>
-              <a:t>01/06/2016</a:t>
+              <a:t>1/7/2016</a:t>
             </a:fld>
             <a:endParaRPr lang="en-US"/>
           </a:p>
@@ -1973,7 +1989,7 @@
           <a:p>
             <a:fld id="{BB838F9D-C89C-430C-A914-9188E8BD18B1}" type="datetimeFigureOut">
               <a:rPr lang="en-US" smtClean="0"/>
-              <a:t>01/06/2016</a:t>
+              <a:t>1/7/2016</a:t>
             </a:fld>
             <a:endParaRPr lang="en-US"/>
           </a:p>
@@ -2262,7 +2278,7 @@
           <a:p>
             <a:fld id="{BB838F9D-C89C-430C-A914-9188E8BD18B1}" type="datetimeFigureOut">
               <a:rPr lang="en-US" smtClean="0"/>
-              <a:t>01/06/2016</a:t>
+              <a:t>1/7/2016</a:t>
             </a:fld>
             <a:endParaRPr lang="en-US"/>
           </a:p>
@@ -2531,7 +2547,7 @@
           <a:p>
             <a:fld id="{BB838F9D-C89C-430C-A914-9188E8BD18B1}" type="datetimeFigureOut">
               <a:rPr lang="en-US" smtClean="0"/>
-              <a:t>01/06/2016</a:t>
+              <a:t>1/7/2016</a:t>
             </a:fld>
             <a:endParaRPr lang="en-US"/>
           </a:p>
@@ -2859,7 +2875,7 @@
           <a:p>
             <a:fld id="{BB838F9D-C89C-430C-A914-9188E8BD18B1}" type="datetimeFigureOut">
               <a:rPr lang="en-US" smtClean="0"/>
-              <a:t>01/06/2016</a:t>
+              <a:t>1/7/2016</a:t>
             </a:fld>
             <a:endParaRPr lang="en-US"/>
           </a:p>
@@ -3598,7 +3614,7 @@
         </p:blipFill>
         <p:spPr>
           <a:xfrm>
-            <a:off x="2255342" y="2667000"/>
+            <a:off x="1981200" y="2667000"/>
             <a:ext cx="5146033" cy="2691432"/>
           </a:xfrm>
           <a:prstGeom prst="roundRect">
@@ -3677,8 +3693,8 @@
         </p:nvSpPr>
         <p:spPr>
           <a:xfrm>
-            <a:off x="3733800" y="381000"/>
-            <a:ext cx="1877437" cy="646331"/>
+            <a:off x="2203094" y="381000"/>
+            <a:ext cx="5006499" cy="646331"/>
           </a:xfrm>
           <a:prstGeom prst="rect">
             <a:avLst/>
@@ -3691,6 +3707,18 @@
           </a:bodyPr>
           <a:lstStyle/>
           <a:p>
+            <a:r>
+              <a:rPr lang="en-US" sz="3600" b="1" dirty="0" err="1" smtClean="0">
+                <a:effectLst>
+                  <a:outerShdw blurRad="38100" dist="38100" dir="2700000" algn="tl">
+                    <a:srgbClr val="000000">
+                      <a:alpha val="43137"/>
+                    </a:srgbClr>
+                  </a:outerShdw>
+                </a:effectLst>
+              </a:rPr>
+              <a:t>GitHub</a:t>
+            </a:r>
             <a:r>
               <a:rPr lang="en-US" sz="3600" b="1" dirty="0" smtClean="0">
                 <a:effectLst>
@@ -3701,7 +3729,7 @@
                   </a:outerShdw>
                 </a:effectLst>
               </a:rPr>
-              <a:t>GitHub:</a:t>
+              <a:t> &amp; Live version</a:t>
             </a:r>
             <a:endParaRPr lang="en-US" sz="3600" b="1" dirty="0">
               <a:effectLst>
@@ -3723,8 +3751,8 @@
         </p:nvSpPr>
         <p:spPr>
           <a:xfrm>
-            <a:off x="519137" y="2971800"/>
-            <a:ext cx="8306761" cy="646331"/>
+            <a:off x="270963" y="2590800"/>
+            <a:ext cx="8870762" cy="2308324"/>
           </a:xfrm>
           <a:prstGeom prst="rect">
             <a:avLst/>
@@ -3746,9 +3774,82 @@
                     </a:srgbClr>
                   </a:outerShdw>
                 </a:effectLst>
+                <a:hlinkClick r:id="rId2"/>
               </a:rPr>
-              <a:t>https://github.com/bewolf/Allied-Tion</a:t>
-            </a:r>
+              <a:t>https://</a:t>
+            </a:r>
+            <a:r>
+              <a:rPr lang="en-US" sz="3600" b="1" dirty="0" smtClean="0">
+                <a:effectLst>
+                  <a:outerShdw blurRad="38100" dist="38100" dir="2700000" algn="tl">
+                    <a:srgbClr val="000000">
+                      <a:alpha val="43137"/>
+                    </a:srgbClr>
+                  </a:outerShdw>
+                </a:effectLst>
+                <a:hlinkClick r:id="rId2"/>
+              </a:rPr>
+              <a:t>github.com/bewolf/Allied-Tion</a:t>
+            </a:r>
+            <a:endParaRPr lang="en-US" sz="3600" b="1" dirty="0" smtClean="0">
+              <a:effectLst>
+                <a:outerShdw blurRad="38100" dist="38100" dir="2700000" algn="tl">
+                  <a:srgbClr val="000000">
+                    <a:alpha val="43137"/>
+                  </a:srgbClr>
+                </a:outerShdw>
+              </a:effectLst>
+            </a:endParaRPr>
+          </a:p>
+          <a:p>
+            <a:endParaRPr lang="en-US" sz="3600" b="1" dirty="0" smtClean="0">
+              <a:effectLst>
+                <a:outerShdw blurRad="38100" dist="38100" dir="2700000" algn="tl">
+                  <a:srgbClr val="000000">
+                    <a:alpha val="43137"/>
+                  </a:srgbClr>
+                </a:outerShdw>
+              </a:effectLst>
+            </a:endParaRPr>
+          </a:p>
+          <a:p>
+            <a:r>
+              <a:rPr lang="en-US" sz="3600" b="1" dirty="0">
+                <a:effectLst>
+                  <a:outerShdw blurRad="38100" dist="38100" dir="2700000" algn="tl">
+                    <a:srgbClr val="000000">
+                      <a:alpha val="43137"/>
+                    </a:srgbClr>
+                  </a:outerShdw>
+                </a:effectLst>
+                <a:hlinkClick r:id="rId3"/>
+              </a:rPr>
+              <a:t>http://</a:t>
+            </a:r>
+            <a:r>
+              <a:rPr lang="en-US" sz="3600" b="1" dirty="0" smtClean="0">
+                <a:effectLst>
+                  <a:outerShdw blurRad="38100" dist="38100" dir="2700000" algn="tl">
+                    <a:srgbClr val="000000">
+                      <a:alpha val="43137"/>
+                    </a:srgbClr>
+                  </a:outerShdw>
+                </a:effectLst>
+                <a:hlinkClick r:id="rId3"/>
+              </a:rPr>
+              <a:t>allied-tion.matsov.com/index.html</a:t>
+            </a:r>
+            <a:endParaRPr lang="en-US" sz="3600" b="1" dirty="0" smtClean="0">
+              <a:effectLst>
+                <a:outerShdw blurRad="38100" dist="38100" dir="2700000" algn="tl">
+                  <a:srgbClr val="000000">
+                    <a:alpha val="43137"/>
+                  </a:srgbClr>
+                </a:outerShdw>
+              </a:effectLst>
+            </a:endParaRPr>
+          </a:p>
+          <a:p>
             <a:endParaRPr lang="en-US" sz="3600" b="1" dirty="0">
               <a:effectLst>
                 <a:outerShdw blurRad="38100" dist="38100" dir="2700000" algn="tl">
@@ -3770,7 +3871,7 @@
           <p:nvPr/>
         </p:nvPicPr>
         <p:blipFill>
-          <a:blip r:embed="rId2">
+          <a:blip r:embed="rId4">
             <a:extLst>
               <a:ext uri="{28A0092B-C50C-407E-A947-70E740481C1C}">
                 <a14:useLocalDpi xmlns:a14="http://schemas.microsoft.com/office/drawing/2010/main" val="0"/>

</xml_diff>